<commit_message>
update general, machine learning and output images for Task 3
</commit_message>
<xml_diff>
--- a/Table of Variation.pptx
+++ b/Table of Variation.pptx
@@ -16,7 +16,9 @@
     <p:sldId id="262" r:id="rId10"/>
     <p:sldId id="259" r:id="rId11"/>
     <p:sldId id="260" r:id="rId12"/>
-    <p:sldId id="268" r:id="rId13"/>
+    <p:sldId id="270" r:id="rId13"/>
+    <p:sldId id="269" r:id="rId14"/>
+    <p:sldId id="268" r:id="rId15"/>
   </p:sldIdLst>
   <p:sldSz cx="12192000" cy="6858000"/>
   <p:notesSz cx="6858000" cy="9144000"/>
@@ -254,7 +256,7 @@
           <a:p>
             <a:fld id="{50BC8A03-A3C0-438B-B5CB-C5293B399AEC}" type="datetimeFigureOut">
               <a:rPr lang="de-CH" smtClean="0"/>
-              <a:t>23.05.2020</a:t>
+              <a:t>31.05.2020</a:t>
             </a:fld>
             <a:endParaRPr lang="de-CH"/>
           </a:p>
@@ -424,7 +426,7 @@
           <a:p>
             <a:fld id="{50BC8A03-A3C0-438B-B5CB-C5293B399AEC}" type="datetimeFigureOut">
               <a:rPr lang="de-CH" smtClean="0"/>
-              <a:t>23.05.2020</a:t>
+              <a:t>31.05.2020</a:t>
             </a:fld>
             <a:endParaRPr lang="de-CH"/>
           </a:p>
@@ -604,7 +606,7 @@
           <a:p>
             <a:fld id="{50BC8A03-A3C0-438B-B5CB-C5293B399AEC}" type="datetimeFigureOut">
               <a:rPr lang="de-CH" smtClean="0"/>
-              <a:t>23.05.2020</a:t>
+              <a:t>31.05.2020</a:t>
             </a:fld>
             <a:endParaRPr lang="de-CH"/>
           </a:p>
@@ -774,7 +776,7 @@
           <a:p>
             <a:fld id="{50BC8A03-A3C0-438B-B5CB-C5293B399AEC}" type="datetimeFigureOut">
               <a:rPr lang="de-CH" smtClean="0"/>
-              <a:t>23.05.2020</a:t>
+              <a:t>31.05.2020</a:t>
             </a:fld>
             <a:endParaRPr lang="de-CH"/>
           </a:p>
@@ -1020,7 +1022,7 @@
           <a:p>
             <a:fld id="{50BC8A03-A3C0-438B-B5CB-C5293B399AEC}" type="datetimeFigureOut">
               <a:rPr lang="de-CH" smtClean="0"/>
-              <a:t>23.05.2020</a:t>
+              <a:t>31.05.2020</a:t>
             </a:fld>
             <a:endParaRPr lang="de-CH"/>
           </a:p>
@@ -1252,7 +1254,7 @@
           <a:p>
             <a:fld id="{50BC8A03-A3C0-438B-B5CB-C5293B399AEC}" type="datetimeFigureOut">
               <a:rPr lang="de-CH" smtClean="0"/>
-              <a:t>23.05.2020</a:t>
+              <a:t>31.05.2020</a:t>
             </a:fld>
             <a:endParaRPr lang="de-CH"/>
           </a:p>
@@ -1619,7 +1621,7 @@
           <a:p>
             <a:fld id="{50BC8A03-A3C0-438B-B5CB-C5293B399AEC}" type="datetimeFigureOut">
               <a:rPr lang="de-CH" smtClean="0"/>
-              <a:t>23.05.2020</a:t>
+              <a:t>31.05.2020</a:t>
             </a:fld>
             <a:endParaRPr lang="de-CH"/>
           </a:p>
@@ -1737,7 +1739,7 @@
           <a:p>
             <a:fld id="{50BC8A03-A3C0-438B-B5CB-C5293B399AEC}" type="datetimeFigureOut">
               <a:rPr lang="de-CH" smtClean="0"/>
-              <a:t>23.05.2020</a:t>
+              <a:t>31.05.2020</a:t>
             </a:fld>
             <a:endParaRPr lang="de-CH"/>
           </a:p>
@@ -1832,7 +1834,7 @@
           <a:p>
             <a:fld id="{50BC8A03-A3C0-438B-B5CB-C5293B399AEC}" type="datetimeFigureOut">
               <a:rPr lang="de-CH" smtClean="0"/>
-              <a:t>23.05.2020</a:t>
+              <a:t>31.05.2020</a:t>
             </a:fld>
             <a:endParaRPr lang="de-CH"/>
           </a:p>
@@ -2109,7 +2111,7 @@
           <a:p>
             <a:fld id="{50BC8A03-A3C0-438B-B5CB-C5293B399AEC}" type="datetimeFigureOut">
               <a:rPr lang="de-CH" smtClean="0"/>
-              <a:t>23.05.2020</a:t>
+              <a:t>31.05.2020</a:t>
             </a:fld>
             <a:endParaRPr lang="de-CH"/>
           </a:p>
@@ -2362,7 +2364,7 @@
           <a:p>
             <a:fld id="{50BC8A03-A3C0-438B-B5CB-C5293B399AEC}" type="datetimeFigureOut">
               <a:rPr lang="de-CH" smtClean="0"/>
-              <a:t>23.05.2020</a:t>
+              <a:t>31.05.2020</a:t>
             </a:fld>
             <a:endParaRPr lang="de-CH"/>
           </a:p>
@@ -2575,7 +2577,7 @@
           <a:p>
             <a:fld id="{50BC8A03-A3C0-438B-B5CB-C5293B399AEC}" type="datetimeFigureOut">
               <a:rPr lang="de-CH" smtClean="0"/>
-              <a:t>23.05.2020</a:t>
+              <a:t>31.05.2020</a:t>
             </a:fld>
             <a:endParaRPr lang="de-CH"/>
           </a:p>
@@ -3409,6 +3411,2178 @@
       </p:grpSpPr>
       <p:sp>
         <p:nvSpPr>
+          <p:cNvPr id="2" name="Titel 1">
+            <a:extLst>
+              <a:ext uri="{FF2B5EF4-FFF2-40B4-BE49-F238E27FC236}">
+                <a16:creationId xmlns:a16="http://schemas.microsoft.com/office/drawing/2014/main" id="{465C5F5B-FF16-4DC7-9694-448CC732E064}"/>
+              </a:ext>
+            </a:extLst>
+          </p:cNvPr>
+          <p:cNvSpPr>
+            <a:spLocks noGrp="1"/>
+          </p:cNvSpPr>
+          <p:nvPr>
+            <p:ph type="title"/>
+          </p:nvPr>
+        </p:nvSpPr>
+        <p:spPr/>
+        <p:txBody>
+          <a:bodyPr/>
+          <a:lstStyle/>
+          <a:p>
+            <a:r>
+              <a:rPr lang="de-CH" dirty="0" err="1"/>
+              <a:t>Pairwise</a:t>
+            </a:r>
+            <a:r>
+              <a:rPr lang="de-CH" dirty="0"/>
+              <a:t>: </a:t>
+            </a:r>
+            <a:r>
+              <a:rPr lang="de-CH" dirty="0" err="1"/>
+              <a:t>Combination</a:t>
+            </a:r>
+            <a:r>
+              <a:rPr lang="de-CH" dirty="0"/>
+              <a:t>, Permutation, </a:t>
+            </a:r>
+            <a:r>
+              <a:rPr lang="de-CH" dirty="0" err="1"/>
+              <a:t>Cartesian</a:t>
+            </a:r>
+            <a:r>
+              <a:rPr lang="de-CH" dirty="0"/>
+              <a:t> </a:t>
+            </a:r>
+            <a:r>
+              <a:rPr lang="de-CH" dirty="0" err="1"/>
+              <a:t>product</a:t>
+            </a:r>
+            <a:endParaRPr lang="de-CH" dirty="0"/>
+          </a:p>
+        </p:txBody>
+      </p:sp>
+      <p:graphicFrame>
+        <p:nvGraphicFramePr>
+          <p:cNvPr id="3" name="Tabelle 3">
+            <a:extLst>
+              <a:ext uri="{FF2B5EF4-FFF2-40B4-BE49-F238E27FC236}">
+                <a16:creationId xmlns:a16="http://schemas.microsoft.com/office/drawing/2014/main" id="{5D7D87B2-A399-49ED-8E5F-588BD5877C0E}"/>
+              </a:ext>
+            </a:extLst>
+          </p:cNvPr>
+          <p:cNvGraphicFramePr>
+            <a:graphicFrameLocks noGrp="1"/>
+          </p:cNvGraphicFramePr>
+          <p:nvPr>
+            <p:extLst>
+              <p:ext uri="{D42A27DB-BD31-4B8C-83A1-F6EECF244321}">
+                <p14:modId xmlns:p14="http://schemas.microsoft.com/office/powerpoint/2010/main" val="3955526570"/>
+              </p:ext>
+            </p:extLst>
+          </p:nvPr>
+        </p:nvGraphicFramePr>
+        <p:xfrm>
+          <a:off x="967971" y="3021984"/>
+          <a:ext cx="3462712" cy="2193944"/>
+        </p:xfrm>
+        <a:graphic>
+          <a:graphicData uri="http://schemas.openxmlformats.org/drawingml/2006/table">
+            <a:tbl>
+              <a:tblPr firstRow="1" bandRow="1">
+                <a:tableStyleId>{5940675A-B579-460E-94D1-54222C63F5DA}</a:tableStyleId>
+              </a:tblPr>
+              <a:tblGrid>
+                <a:gridCol w="865678">
+                  <a:extLst>
+                    <a:ext uri="{9D8B030D-6E8A-4147-A177-3AD203B41FA5}">
+                      <a16:colId xmlns:a16="http://schemas.microsoft.com/office/drawing/2014/main" val="638110134"/>
+                    </a:ext>
+                  </a:extLst>
+                </a:gridCol>
+                <a:gridCol w="865678">
+                  <a:extLst>
+                    <a:ext uri="{9D8B030D-6E8A-4147-A177-3AD203B41FA5}">
+                      <a16:colId xmlns:a16="http://schemas.microsoft.com/office/drawing/2014/main" val="1066491733"/>
+                    </a:ext>
+                  </a:extLst>
+                </a:gridCol>
+                <a:gridCol w="865678">
+                  <a:extLst>
+                    <a:ext uri="{9D8B030D-6E8A-4147-A177-3AD203B41FA5}">
+                      <a16:colId xmlns:a16="http://schemas.microsoft.com/office/drawing/2014/main" val="117178429"/>
+                    </a:ext>
+                  </a:extLst>
+                </a:gridCol>
+                <a:gridCol w="865678">
+                  <a:extLst>
+                    <a:ext uri="{9D8B030D-6E8A-4147-A177-3AD203B41FA5}">
+                      <a16:colId xmlns:a16="http://schemas.microsoft.com/office/drawing/2014/main" val="1852374248"/>
+                    </a:ext>
+                  </a:extLst>
+                </a:gridCol>
+              </a:tblGrid>
+              <a:tr h="548486">
+                <a:tc>
+                  <a:txBody>
+                    <a:bodyPr/>
+                    <a:lstStyle/>
+                    <a:p>
+                      <a:endParaRPr lang="de-CH"/>
+                    </a:p>
+                  </a:txBody>
+                  <a:tcPr/>
+                </a:tc>
+                <a:tc>
+                  <a:txBody>
+                    <a:bodyPr/>
+                    <a:lstStyle/>
+                    <a:p>
+                      <a:r>
+                        <a:rPr lang="de-CH" dirty="0"/>
+                        <a:t>Cat</a:t>
+                      </a:r>
+                    </a:p>
+                  </a:txBody>
+                  <a:tcPr/>
+                </a:tc>
+                <a:tc>
+                  <a:txBody>
+                    <a:bodyPr/>
+                    <a:lstStyle/>
+                    <a:p>
+                      <a:r>
+                        <a:rPr lang="de-CH" dirty="0"/>
+                        <a:t>Dog</a:t>
+                      </a:r>
+                    </a:p>
+                  </a:txBody>
+                  <a:tcPr/>
+                </a:tc>
+                <a:tc>
+                  <a:txBody>
+                    <a:bodyPr/>
+                    <a:lstStyle/>
+                    <a:p>
+                      <a:r>
+                        <a:rPr lang="de-CH" dirty="0"/>
+                        <a:t>Rabbit</a:t>
+                      </a:r>
+                    </a:p>
+                  </a:txBody>
+                  <a:tcPr/>
+                </a:tc>
+                <a:extLst>
+                  <a:ext uri="{0D108BD9-81ED-4DB2-BD59-A6C34878D82A}">
+                    <a16:rowId xmlns:a16="http://schemas.microsoft.com/office/drawing/2014/main" val="1847978346"/>
+                  </a:ext>
+                </a:extLst>
+              </a:tr>
+              <a:tr h="548486">
+                <a:tc>
+                  <a:txBody>
+                    <a:bodyPr/>
+                    <a:lstStyle/>
+                    <a:p>
+                      <a:r>
+                        <a:rPr lang="de-CH" dirty="0"/>
+                        <a:t>Cat</a:t>
+                      </a:r>
+                    </a:p>
+                  </a:txBody>
+                  <a:tcPr/>
+                </a:tc>
+                <a:tc>
+                  <a:txBody>
+                    <a:bodyPr/>
+                    <a:lstStyle/>
+                    <a:p>
+                      <a:r>
+                        <a:rPr lang="de-CH" dirty="0"/>
+                        <a:t>1</a:t>
+                      </a:r>
+                    </a:p>
+                  </a:txBody>
+                  <a:tcPr/>
+                </a:tc>
+                <a:tc>
+                  <a:txBody>
+                    <a:bodyPr/>
+                    <a:lstStyle/>
+                    <a:p>
+                      <a:r>
+                        <a:rPr lang="de-CH" dirty="0"/>
+                        <a:t>2</a:t>
+                      </a:r>
+                    </a:p>
+                  </a:txBody>
+                  <a:tcPr/>
+                </a:tc>
+                <a:tc>
+                  <a:txBody>
+                    <a:bodyPr/>
+                    <a:lstStyle/>
+                    <a:p>
+                      <a:r>
+                        <a:rPr lang="de-CH" dirty="0"/>
+                        <a:t>0</a:t>
+                      </a:r>
+                    </a:p>
+                  </a:txBody>
+                  <a:tcPr/>
+                </a:tc>
+                <a:extLst>
+                  <a:ext uri="{0D108BD9-81ED-4DB2-BD59-A6C34878D82A}">
+                    <a16:rowId xmlns:a16="http://schemas.microsoft.com/office/drawing/2014/main" val="383714595"/>
+                  </a:ext>
+                </a:extLst>
+              </a:tr>
+              <a:tr h="548486">
+                <a:tc>
+                  <a:txBody>
+                    <a:bodyPr/>
+                    <a:lstStyle/>
+                    <a:p>
+                      <a:r>
+                        <a:rPr lang="de-CH" dirty="0"/>
+                        <a:t>Dog</a:t>
+                      </a:r>
+                    </a:p>
+                  </a:txBody>
+                  <a:tcPr/>
+                </a:tc>
+                <a:tc>
+                  <a:txBody>
+                    <a:bodyPr/>
+                    <a:lstStyle/>
+                    <a:p>
+                      <a:r>
+                        <a:rPr lang="de-CH" dirty="0"/>
+                        <a:t>2</a:t>
+                      </a:r>
+                    </a:p>
+                  </a:txBody>
+                  <a:tcPr/>
+                </a:tc>
+                <a:tc>
+                  <a:txBody>
+                    <a:bodyPr/>
+                    <a:lstStyle/>
+                    <a:p>
+                      <a:r>
+                        <a:rPr lang="de-CH" dirty="0"/>
+                        <a:t>1</a:t>
+                      </a:r>
+                    </a:p>
+                  </a:txBody>
+                  <a:tcPr/>
+                </a:tc>
+                <a:tc>
+                  <a:txBody>
+                    <a:bodyPr/>
+                    <a:lstStyle/>
+                    <a:p>
+                      <a:r>
+                        <a:rPr lang="de-CH" dirty="0"/>
+                        <a:t>2</a:t>
+                      </a:r>
+                    </a:p>
+                  </a:txBody>
+                  <a:tcPr/>
+                </a:tc>
+                <a:extLst>
+                  <a:ext uri="{0D108BD9-81ED-4DB2-BD59-A6C34878D82A}">
+                    <a16:rowId xmlns:a16="http://schemas.microsoft.com/office/drawing/2014/main" val="3045195813"/>
+                  </a:ext>
+                </a:extLst>
+              </a:tr>
+              <a:tr h="548486">
+                <a:tc>
+                  <a:txBody>
+                    <a:bodyPr/>
+                    <a:lstStyle/>
+                    <a:p>
+                      <a:r>
+                        <a:rPr lang="de-CH" dirty="0"/>
+                        <a:t>Rabbit</a:t>
+                      </a:r>
+                    </a:p>
+                  </a:txBody>
+                  <a:tcPr/>
+                </a:tc>
+                <a:tc>
+                  <a:txBody>
+                    <a:bodyPr/>
+                    <a:lstStyle/>
+                    <a:p>
+                      <a:r>
+                        <a:rPr lang="de-CH" dirty="0"/>
+                        <a:t>0</a:t>
+                      </a:r>
+                    </a:p>
+                  </a:txBody>
+                  <a:tcPr/>
+                </a:tc>
+                <a:tc>
+                  <a:txBody>
+                    <a:bodyPr/>
+                    <a:lstStyle/>
+                    <a:p>
+                      <a:r>
+                        <a:rPr lang="de-CH" dirty="0"/>
+                        <a:t>2</a:t>
+                      </a:r>
+                    </a:p>
+                  </a:txBody>
+                  <a:tcPr/>
+                </a:tc>
+                <a:tc>
+                  <a:txBody>
+                    <a:bodyPr/>
+                    <a:lstStyle/>
+                    <a:p>
+                      <a:r>
+                        <a:rPr lang="de-CH" dirty="0"/>
+                        <a:t>1</a:t>
+                      </a:r>
+                    </a:p>
+                  </a:txBody>
+                  <a:tcPr/>
+                </a:tc>
+                <a:extLst>
+                  <a:ext uri="{0D108BD9-81ED-4DB2-BD59-A6C34878D82A}">
+                    <a16:rowId xmlns:a16="http://schemas.microsoft.com/office/drawing/2014/main" val="2192670241"/>
+                  </a:ext>
+                </a:extLst>
+              </a:tr>
+            </a:tbl>
+          </a:graphicData>
+        </a:graphic>
+      </p:graphicFrame>
+      <p:sp>
+        <p:nvSpPr>
+          <p:cNvPr id="6" name="Rechtwinkliges Dreieck 5">
+            <a:extLst>
+              <a:ext uri="{FF2B5EF4-FFF2-40B4-BE49-F238E27FC236}">
+                <a16:creationId xmlns:a16="http://schemas.microsoft.com/office/drawing/2014/main" id="{4DCB2B37-793F-4DE3-BA31-0043248629F1}"/>
+              </a:ext>
+            </a:extLst>
+          </p:cNvPr>
+          <p:cNvSpPr/>
+          <p:nvPr/>
+        </p:nvSpPr>
+        <p:spPr>
+          <a:xfrm>
+            <a:off x="1891838" y="4118956"/>
+            <a:ext cx="1731356" cy="939338"/>
+          </a:xfrm>
+          <a:prstGeom prst="rtTriangle">
+            <a:avLst/>
+          </a:prstGeom>
+          <a:solidFill>
+            <a:srgbClr val="00B0F0">
+              <a:alpha val="30196"/>
+            </a:srgbClr>
+          </a:solidFill>
+        </p:spPr>
+        <p:style>
+          <a:lnRef idx="2">
+            <a:schemeClr val="accent1">
+              <a:shade val="50000"/>
+            </a:schemeClr>
+          </a:lnRef>
+          <a:fillRef idx="1">
+            <a:schemeClr val="accent1"/>
+          </a:fillRef>
+          <a:effectRef idx="0">
+            <a:schemeClr val="accent1"/>
+          </a:effectRef>
+          <a:fontRef idx="minor">
+            <a:schemeClr val="lt1"/>
+          </a:fontRef>
+        </p:style>
+        <p:txBody>
+          <a:bodyPr rtlCol="0" anchor="ctr"/>
+          <a:lstStyle/>
+          <a:p>
+            <a:pPr algn="ctr"/>
+            <a:endParaRPr lang="de-CH"/>
+          </a:p>
+        </p:txBody>
+      </p:sp>
+      <p:sp>
+        <p:nvSpPr>
+          <p:cNvPr id="8" name="Rechtwinkliges Dreieck 7">
+            <a:extLst>
+              <a:ext uri="{FF2B5EF4-FFF2-40B4-BE49-F238E27FC236}">
+                <a16:creationId xmlns:a16="http://schemas.microsoft.com/office/drawing/2014/main" id="{68A2AB88-4FD5-4167-A80B-4B5D44AFA046}"/>
+              </a:ext>
+            </a:extLst>
+          </p:cNvPr>
+          <p:cNvSpPr/>
+          <p:nvPr/>
+        </p:nvSpPr>
+        <p:spPr>
+          <a:xfrm flipH="1" flipV="1">
+            <a:off x="2699327" y="3667990"/>
+            <a:ext cx="1731356" cy="1003761"/>
+          </a:xfrm>
+          <a:prstGeom prst="rtTriangle">
+            <a:avLst/>
+          </a:prstGeom>
+          <a:solidFill>
+            <a:srgbClr val="00B0F0">
+              <a:alpha val="30196"/>
+            </a:srgbClr>
+          </a:solidFill>
+        </p:spPr>
+        <p:style>
+          <a:lnRef idx="2">
+            <a:schemeClr val="accent1">
+              <a:shade val="50000"/>
+            </a:schemeClr>
+          </a:lnRef>
+          <a:fillRef idx="1">
+            <a:schemeClr val="accent1"/>
+          </a:fillRef>
+          <a:effectRef idx="0">
+            <a:schemeClr val="accent1"/>
+          </a:effectRef>
+          <a:fontRef idx="minor">
+            <a:schemeClr val="lt1"/>
+          </a:fontRef>
+        </p:style>
+        <p:txBody>
+          <a:bodyPr rtlCol="0" anchor="ctr"/>
+          <a:lstStyle/>
+          <a:p>
+            <a:pPr algn="ctr"/>
+            <a:endParaRPr lang="de-CH"/>
+          </a:p>
+        </p:txBody>
+      </p:sp>
+      <p:graphicFrame>
+        <p:nvGraphicFramePr>
+          <p:cNvPr id="9" name="Tabelle 3">
+            <a:extLst>
+              <a:ext uri="{FF2B5EF4-FFF2-40B4-BE49-F238E27FC236}">
+                <a16:creationId xmlns:a16="http://schemas.microsoft.com/office/drawing/2014/main" id="{CCC0067B-AA5D-4202-82A4-E89E093BF31B}"/>
+              </a:ext>
+            </a:extLst>
+          </p:cNvPr>
+          <p:cNvGraphicFramePr>
+            <a:graphicFrameLocks noGrp="1"/>
+          </p:cNvGraphicFramePr>
+          <p:nvPr>
+            <p:extLst>
+              <p:ext uri="{D42A27DB-BD31-4B8C-83A1-F6EECF244321}">
+                <p14:modId xmlns:p14="http://schemas.microsoft.com/office/powerpoint/2010/main" val="2248586587"/>
+              </p:ext>
+            </p:extLst>
+          </p:nvPr>
+        </p:nvGraphicFramePr>
+        <p:xfrm>
+          <a:off x="4644968" y="3021984"/>
+          <a:ext cx="3462712" cy="2193944"/>
+        </p:xfrm>
+        <a:graphic>
+          <a:graphicData uri="http://schemas.openxmlformats.org/drawingml/2006/table">
+            <a:tbl>
+              <a:tblPr firstRow="1" bandRow="1">
+                <a:tableStyleId>{5940675A-B579-460E-94D1-54222C63F5DA}</a:tableStyleId>
+              </a:tblPr>
+              <a:tblGrid>
+                <a:gridCol w="865678">
+                  <a:extLst>
+                    <a:ext uri="{9D8B030D-6E8A-4147-A177-3AD203B41FA5}">
+                      <a16:colId xmlns:a16="http://schemas.microsoft.com/office/drawing/2014/main" val="638110134"/>
+                    </a:ext>
+                  </a:extLst>
+                </a:gridCol>
+                <a:gridCol w="865678">
+                  <a:extLst>
+                    <a:ext uri="{9D8B030D-6E8A-4147-A177-3AD203B41FA5}">
+                      <a16:colId xmlns:a16="http://schemas.microsoft.com/office/drawing/2014/main" val="1066491733"/>
+                    </a:ext>
+                  </a:extLst>
+                </a:gridCol>
+                <a:gridCol w="865678">
+                  <a:extLst>
+                    <a:ext uri="{9D8B030D-6E8A-4147-A177-3AD203B41FA5}">
+                      <a16:colId xmlns:a16="http://schemas.microsoft.com/office/drawing/2014/main" val="117178429"/>
+                    </a:ext>
+                  </a:extLst>
+                </a:gridCol>
+                <a:gridCol w="865678">
+                  <a:extLst>
+                    <a:ext uri="{9D8B030D-6E8A-4147-A177-3AD203B41FA5}">
+                      <a16:colId xmlns:a16="http://schemas.microsoft.com/office/drawing/2014/main" val="1852374248"/>
+                    </a:ext>
+                  </a:extLst>
+                </a:gridCol>
+              </a:tblGrid>
+              <a:tr h="548486">
+                <a:tc>
+                  <a:txBody>
+                    <a:bodyPr/>
+                    <a:lstStyle/>
+                    <a:p>
+                      <a:endParaRPr lang="de-CH"/>
+                    </a:p>
+                  </a:txBody>
+                  <a:tcPr/>
+                </a:tc>
+                <a:tc>
+                  <a:txBody>
+                    <a:bodyPr/>
+                    <a:lstStyle/>
+                    <a:p>
+                      <a:r>
+                        <a:rPr lang="de-CH" dirty="0"/>
+                        <a:t>Cat</a:t>
+                      </a:r>
+                    </a:p>
+                  </a:txBody>
+                  <a:tcPr/>
+                </a:tc>
+                <a:tc>
+                  <a:txBody>
+                    <a:bodyPr/>
+                    <a:lstStyle/>
+                    <a:p>
+                      <a:r>
+                        <a:rPr lang="de-CH" dirty="0"/>
+                        <a:t>Dog</a:t>
+                      </a:r>
+                    </a:p>
+                  </a:txBody>
+                  <a:tcPr/>
+                </a:tc>
+                <a:tc>
+                  <a:txBody>
+                    <a:bodyPr/>
+                    <a:lstStyle/>
+                    <a:p>
+                      <a:r>
+                        <a:rPr lang="de-CH" dirty="0"/>
+                        <a:t>Rabbit</a:t>
+                      </a:r>
+                    </a:p>
+                  </a:txBody>
+                  <a:tcPr/>
+                </a:tc>
+                <a:extLst>
+                  <a:ext uri="{0D108BD9-81ED-4DB2-BD59-A6C34878D82A}">
+                    <a16:rowId xmlns:a16="http://schemas.microsoft.com/office/drawing/2014/main" val="1847978346"/>
+                  </a:ext>
+                </a:extLst>
+              </a:tr>
+              <a:tr h="548486">
+                <a:tc>
+                  <a:txBody>
+                    <a:bodyPr/>
+                    <a:lstStyle/>
+                    <a:p>
+                      <a:r>
+                        <a:rPr lang="de-CH" dirty="0"/>
+                        <a:t>Cat</a:t>
+                      </a:r>
+                    </a:p>
+                  </a:txBody>
+                  <a:tcPr/>
+                </a:tc>
+                <a:tc>
+                  <a:txBody>
+                    <a:bodyPr/>
+                    <a:lstStyle/>
+                    <a:p>
+                      <a:r>
+                        <a:rPr lang="de-CH" dirty="0"/>
+                        <a:t>1</a:t>
+                      </a:r>
+                    </a:p>
+                  </a:txBody>
+                  <a:tcPr/>
+                </a:tc>
+                <a:tc>
+                  <a:txBody>
+                    <a:bodyPr/>
+                    <a:lstStyle/>
+                    <a:p>
+                      <a:r>
+                        <a:rPr lang="de-CH" dirty="0"/>
+                        <a:t>2</a:t>
+                      </a:r>
+                    </a:p>
+                  </a:txBody>
+                  <a:tcPr/>
+                </a:tc>
+                <a:tc>
+                  <a:txBody>
+                    <a:bodyPr/>
+                    <a:lstStyle/>
+                    <a:p>
+                      <a:r>
+                        <a:rPr lang="de-CH" dirty="0"/>
+                        <a:t>0</a:t>
+                      </a:r>
+                    </a:p>
+                  </a:txBody>
+                  <a:tcPr/>
+                </a:tc>
+                <a:extLst>
+                  <a:ext uri="{0D108BD9-81ED-4DB2-BD59-A6C34878D82A}">
+                    <a16:rowId xmlns:a16="http://schemas.microsoft.com/office/drawing/2014/main" val="383714595"/>
+                  </a:ext>
+                </a:extLst>
+              </a:tr>
+              <a:tr h="548486">
+                <a:tc>
+                  <a:txBody>
+                    <a:bodyPr/>
+                    <a:lstStyle/>
+                    <a:p>
+                      <a:r>
+                        <a:rPr lang="de-CH" dirty="0"/>
+                        <a:t>Dog</a:t>
+                      </a:r>
+                    </a:p>
+                  </a:txBody>
+                  <a:tcPr/>
+                </a:tc>
+                <a:tc>
+                  <a:txBody>
+                    <a:bodyPr/>
+                    <a:lstStyle/>
+                    <a:p>
+                      <a:r>
+                        <a:rPr lang="de-CH" dirty="0"/>
+                        <a:t>2</a:t>
+                      </a:r>
+                    </a:p>
+                  </a:txBody>
+                  <a:tcPr/>
+                </a:tc>
+                <a:tc>
+                  <a:txBody>
+                    <a:bodyPr/>
+                    <a:lstStyle/>
+                    <a:p>
+                      <a:r>
+                        <a:rPr lang="de-CH" dirty="0"/>
+                        <a:t>1</a:t>
+                      </a:r>
+                    </a:p>
+                  </a:txBody>
+                  <a:tcPr/>
+                </a:tc>
+                <a:tc>
+                  <a:txBody>
+                    <a:bodyPr/>
+                    <a:lstStyle/>
+                    <a:p>
+                      <a:r>
+                        <a:rPr lang="de-CH" dirty="0"/>
+                        <a:t>2</a:t>
+                      </a:r>
+                    </a:p>
+                  </a:txBody>
+                  <a:tcPr/>
+                </a:tc>
+                <a:extLst>
+                  <a:ext uri="{0D108BD9-81ED-4DB2-BD59-A6C34878D82A}">
+                    <a16:rowId xmlns:a16="http://schemas.microsoft.com/office/drawing/2014/main" val="3045195813"/>
+                  </a:ext>
+                </a:extLst>
+              </a:tr>
+              <a:tr h="548486">
+                <a:tc>
+                  <a:txBody>
+                    <a:bodyPr/>
+                    <a:lstStyle/>
+                    <a:p>
+                      <a:r>
+                        <a:rPr lang="de-CH" dirty="0"/>
+                        <a:t>Rabbit</a:t>
+                      </a:r>
+                    </a:p>
+                  </a:txBody>
+                  <a:tcPr/>
+                </a:tc>
+                <a:tc>
+                  <a:txBody>
+                    <a:bodyPr/>
+                    <a:lstStyle/>
+                    <a:p>
+                      <a:r>
+                        <a:rPr lang="de-CH" dirty="0"/>
+                        <a:t>0</a:t>
+                      </a:r>
+                    </a:p>
+                  </a:txBody>
+                  <a:tcPr/>
+                </a:tc>
+                <a:tc>
+                  <a:txBody>
+                    <a:bodyPr/>
+                    <a:lstStyle/>
+                    <a:p>
+                      <a:r>
+                        <a:rPr lang="de-CH" dirty="0"/>
+                        <a:t>2</a:t>
+                      </a:r>
+                    </a:p>
+                  </a:txBody>
+                  <a:tcPr/>
+                </a:tc>
+                <a:tc>
+                  <a:txBody>
+                    <a:bodyPr/>
+                    <a:lstStyle/>
+                    <a:p>
+                      <a:r>
+                        <a:rPr lang="de-CH" dirty="0"/>
+                        <a:t>1</a:t>
+                      </a:r>
+                    </a:p>
+                  </a:txBody>
+                  <a:tcPr/>
+                </a:tc>
+                <a:extLst>
+                  <a:ext uri="{0D108BD9-81ED-4DB2-BD59-A6C34878D82A}">
+                    <a16:rowId xmlns:a16="http://schemas.microsoft.com/office/drawing/2014/main" val="2192670241"/>
+                  </a:ext>
+                </a:extLst>
+              </a:tr>
+            </a:tbl>
+          </a:graphicData>
+        </a:graphic>
+      </p:graphicFrame>
+      <p:sp>
+        <p:nvSpPr>
+          <p:cNvPr id="11" name="Rechtwinkliges Dreieck 10">
+            <a:extLst>
+              <a:ext uri="{FF2B5EF4-FFF2-40B4-BE49-F238E27FC236}">
+                <a16:creationId xmlns:a16="http://schemas.microsoft.com/office/drawing/2014/main" id="{10D68934-1130-486E-AA5E-F208ED3210C1}"/>
+              </a:ext>
+            </a:extLst>
+          </p:cNvPr>
+          <p:cNvSpPr/>
+          <p:nvPr/>
+        </p:nvSpPr>
+        <p:spPr>
+          <a:xfrm flipH="1" flipV="1">
+            <a:off x="6292735" y="3667989"/>
+            <a:ext cx="1814945" cy="1070265"/>
+          </a:xfrm>
+          <a:prstGeom prst="rtTriangle">
+            <a:avLst/>
+          </a:prstGeom>
+          <a:solidFill>
+            <a:schemeClr val="accent6">
+              <a:lumMod val="60000"/>
+              <a:lumOff val="40000"/>
+              <a:alpha val="30196"/>
+            </a:schemeClr>
+          </a:solidFill>
+          <a:ln>
+            <a:solidFill>
+              <a:schemeClr val="accent6">
+                <a:lumMod val="50000"/>
+              </a:schemeClr>
+            </a:solidFill>
+          </a:ln>
+        </p:spPr>
+        <p:style>
+          <a:lnRef idx="2">
+            <a:schemeClr val="accent1">
+              <a:shade val="50000"/>
+            </a:schemeClr>
+          </a:lnRef>
+          <a:fillRef idx="1">
+            <a:schemeClr val="accent1"/>
+          </a:fillRef>
+          <a:effectRef idx="0">
+            <a:schemeClr val="accent1"/>
+          </a:effectRef>
+          <a:fontRef idx="minor">
+            <a:schemeClr val="lt1"/>
+          </a:fontRef>
+        </p:style>
+        <p:txBody>
+          <a:bodyPr rtlCol="0" anchor="ctr"/>
+          <a:lstStyle/>
+          <a:p>
+            <a:pPr algn="ctr"/>
+            <a:endParaRPr lang="de-CH"/>
+          </a:p>
+        </p:txBody>
+      </p:sp>
+      <p:graphicFrame>
+        <p:nvGraphicFramePr>
+          <p:cNvPr id="12" name="Tabelle 3">
+            <a:extLst>
+              <a:ext uri="{FF2B5EF4-FFF2-40B4-BE49-F238E27FC236}">
+                <a16:creationId xmlns:a16="http://schemas.microsoft.com/office/drawing/2014/main" id="{5294E9F8-3499-47BD-B4D2-C865B2D796A4}"/>
+              </a:ext>
+            </a:extLst>
+          </p:cNvPr>
+          <p:cNvGraphicFramePr>
+            <a:graphicFrameLocks noGrp="1"/>
+          </p:cNvGraphicFramePr>
+          <p:nvPr>
+            <p:extLst>
+              <p:ext uri="{D42A27DB-BD31-4B8C-83A1-F6EECF244321}">
+                <p14:modId xmlns:p14="http://schemas.microsoft.com/office/powerpoint/2010/main" val="3152270099"/>
+              </p:ext>
+            </p:extLst>
+          </p:nvPr>
+        </p:nvGraphicFramePr>
+        <p:xfrm>
+          <a:off x="8321965" y="3021984"/>
+          <a:ext cx="3462712" cy="2193944"/>
+        </p:xfrm>
+        <a:graphic>
+          <a:graphicData uri="http://schemas.openxmlformats.org/drawingml/2006/table">
+            <a:tbl>
+              <a:tblPr firstRow="1" bandRow="1">
+                <a:tableStyleId>{5940675A-B579-460E-94D1-54222C63F5DA}</a:tableStyleId>
+              </a:tblPr>
+              <a:tblGrid>
+                <a:gridCol w="865678">
+                  <a:extLst>
+                    <a:ext uri="{9D8B030D-6E8A-4147-A177-3AD203B41FA5}">
+                      <a16:colId xmlns:a16="http://schemas.microsoft.com/office/drawing/2014/main" val="638110134"/>
+                    </a:ext>
+                  </a:extLst>
+                </a:gridCol>
+                <a:gridCol w="865678">
+                  <a:extLst>
+                    <a:ext uri="{9D8B030D-6E8A-4147-A177-3AD203B41FA5}">
+                      <a16:colId xmlns:a16="http://schemas.microsoft.com/office/drawing/2014/main" val="1066491733"/>
+                    </a:ext>
+                  </a:extLst>
+                </a:gridCol>
+                <a:gridCol w="865678">
+                  <a:extLst>
+                    <a:ext uri="{9D8B030D-6E8A-4147-A177-3AD203B41FA5}">
+                      <a16:colId xmlns:a16="http://schemas.microsoft.com/office/drawing/2014/main" val="117178429"/>
+                    </a:ext>
+                  </a:extLst>
+                </a:gridCol>
+                <a:gridCol w="865678">
+                  <a:extLst>
+                    <a:ext uri="{9D8B030D-6E8A-4147-A177-3AD203B41FA5}">
+                      <a16:colId xmlns:a16="http://schemas.microsoft.com/office/drawing/2014/main" val="1852374248"/>
+                    </a:ext>
+                  </a:extLst>
+                </a:gridCol>
+              </a:tblGrid>
+              <a:tr h="548486">
+                <a:tc>
+                  <a:txBody>
+                    <a:bodyPr/>
+                    <a:lstStyle/>
+                    <a:p>
+                      <a:endParaRPr lang="de-CH" dirty="0"/>
+                    </a:p>
+                  </a:txBody>
+                  <a:tcPr/>
+                </a:tc>
+                <a:tc>
+                  <a:txBody>
+                    <a:bodyPr/>
+                    <a:lstStyle/>
+                    <a:p>
+                      <a:r>
+                        <a:rPr lang="de-CH" dirty="0"/>
+                        <a:t>Cat</a:t>
+                      </a:r>
+                    </a:p>
+                  </a:txBody>
+                  <a:tcPr/>
+                </a:tc>
+                <a:tc>
+                  <a:txBody>
+                    <a:bodyPr/>
+                    <a:lstStyle/>
+                    <a:p>
+                      <a:r>
+                        <a:rPr lang="de-CH" dirty="0"/>
+                        <a:t>Dog</a:t>
+                      </a:r>
+                    </a:p>
+                  </a:txBody>
+                  <a:tcPr/>
+                </a:tc>
+                <a:tc>
+                  <a:txBody>
+                    <a:bodyPr/>
+                    <a:lstStyle/>
+                    <a:p>
+                      <a:r>
+                        <a:rPr lang="de-CH" dirty="0"/>
+                        <a:t>Rabbit</a:t>
+                      </a:r>
+                    </a:p>
+                  </a:txBody>
+                  <a:tcPr/>
+                </a:tc>
+                <a:extLst>
+                  <a:ext uri="{0D108BD9-81ED-4DB2-BD59-A6C34878D82A}">
+                    <a16:rowId xmlns:a16="http://schemas.microsoft.com/office/drawing/2014/main" val="1847978346"/>
+                  </a:ext>
+                </a:extLst>
+              </a:tr>
+              <a:tr h="548486">
+                <a:tc>
+                  <a:txBody>
+                    <a:bodyPr/>
+                    <a:lstStyle/>
+                    <a:p>
+                      <a:r>
+                        <a:rPr lang="de-CH" dirty="0"/>
+                        <a:t>Cat</a:t>
+                      </a:r>
+                    </a:p>
+                  </a:txBody>
+                  <a:tcPr/>
+                </a:tc>
+                <a:tc>
+                  <a:txBody>
+                    <a:bodyPr/>
+                    <a:lstStyle/>
+                    <a:p>
+                      <a:r>
+                        <a:rPr lang="de-CH" dirty="0"/>
+                        <a:t>1</a:t>
+                      </a:r>
+                    </a:p>
+                  </a:txBody>
+                  <a:tcPr/>
+                </a:tc>
+                <a:tc>
+                  <a:txBody>
+                    <a:bodyPr/>
+                    <a:lstStyle/>
+                    <a:p>
+                      <a:r>
+                        <a:rPr lang="de-CH" dirty="0"/>
+                        <a:t>2</a:t>
+                      </a:r>
+                    </a:p>
+                  </a:txBody>
+                  <a:tcPr/>
+                </a:tc>
+                <a:tc>
+                  <a:txBody>
+                    <a:bodyPr/>
+                    <a:lstStyle/>
+                    <a:p>
+                      <a:r>
+                        <a:rPr lang="de-CH" dirty="0"/>
+                        <a:t>0</a:t>
+                      </a:r>
+                    </a:p>
+                  </a:txBody>
+                  <a:tcPr/>
+                </a:tc>
+                <a:extLst>
+                  <a:ext uri="{0D108BD9-81ED-4DB2-BD59-A6C34878D82A}">
+                    <a16:rowId xmlns:a16="http://schemas.microsoft.com/office/drawing/2014/main" val="383714595"/>
+                  </a:ext>
+                </a:extLst>
+              </a:tr>
+              <a:tr h="548486">
+                <a:tc>
+                  <a:txBody>
+                    <a:bodyPr/>
+                    <a:lstStyle/>
+                    <a:p>
+                      <a:r>
+                        <a:rPr lang="de-CH" dirty="0"/>
+                        <a:t>Dog</a:t>
+                      </a:r>
+                    </a:p>
+                  </a:txBody>
+                  <a:tcPr/>
+                </a:tc>
+                <a:tc>
+                  <a:txBody>
+                    <a:bodyPr/>
+                    <a:lstStyle/>
+                    <a:p>
+                      <a:r>
+                        <a:rPr lang="de-CH" dirty="0"/>
+                        <a:t>2</a:t>
+                      </a:r>
+                    </a:p>
+                  </a:txBody>
+                  <a:tcPr/>
+                </a:tc>
+                <a:tc>
+                  <a:txBody>
+                    <a:bodyPr/>
+                    <a:lstStyle/>
+                    <a:p>
+                      <a:r>
+                        <a:rPr lang="de-CH" dirty="0"/>
+                        <a:t>1</a:t>
+                      </a:r>
+                    </a:p>
+                  </a:txBody>
+                  <a:tcPr/>
+                </a:tc>
+                <a:tc>
+                  <a:txBody>
+                    <a:bodyPr/>
+                    <a:lstStyle/>
+                    <a:p>
+                      <a:r>
+                        <a:rPr lang="de-CH" dirty="0"/>
+                        <a:t>2</a:t>
+                      </a:r>
+                    </a:p>
+                  </a:txBody>
+                  <a:tcPr/>
+                </a:tc>
+                <a:extLst>
+                  <a:ext uri="{0D108BD9-81ED-4DB2-BD59-A6C34878D82A}">
+                    <a16:rowId xmlns:a16="http://schemas.microsoft.com/office/drawing/2014/main" val="3045195813"/>
+                  </a:ext>
+                </a:extLst>
+              </a:tr>
+              <a:tr h="548486">
+                <a:tc>
+                  <a:txBody>
+                    <a:bodyPr/>
+                    <a:lstStyle/>
+                    <a:p>
+                      <a:r>
+                        <a:rPr lang="de-CH" dirty="0"/>
+                        <a:t>Rabbit</a:t>
+                      </a:r>
+                    </a:p>
+                  </a:txBody>
+                  <a:tcPr/>
+                </a:tc>
+                <a:tc>
+                  <a:txBody>
+                    <a:bodyPr/>
+                    <a:lstStyle/>
+                    <a:p>
+                      <a:r>
+                        <a:rPr lang="de-CH" dirty="0"/>
+                        <a:t>0</a:t>
+                      </a:r>
+                    </a:p>
+                  </a:txBody>
+                  <a:tcPr/>
+                </a:tc>
+                <a:tc>
+                  <a:txBody>
+                    <a:bodyPr/>
+                    <a:lstStyle/>
+                    <a:p>
+                      <a:r>
+                        <a:rPr lang="de-CH" dirty="0"/>
+                        <a:t>2</a:t>
+                      </a:r>
+                    </a:p>
+                  </a:txBody>
+                  <a:tcPr/>
+                </a:tc>
+                <a:tc>
+                  <a:txBody>
+                    <a:bodyPr/>
+                    <a:lstStyle/>
+                    <a:p>
+                      <a:r>
+                        <a:rPr lang="de-CH" dirty="0"/>
+                        <a:t>1</a:t>
+                      </a:r>
+                    </a:p>
+                  </a:txBody>
+                  <a:tcPr/>
+                </a:tc>
+                <a:extLst>
+                  <a:ext uri="{0D108BD9-81ED-4DB2-BD59-A6C34878D82A}">
+                    <a16:rowId xmlns:a16="http://schemas.microsoft.com/office/drawing/2014/main" val="2192670241"/>
+                  </a:ext>
+                </a:extLst>
+              </a:tr>
+            </a:tbl>
+          </a:graphicData>
+        </a:graphic>
+      </p:graphicFrame>
+      <p:sp>
+        <p:nvSpPr>
+          <p:cNvPr id="13" name="Rechteck 12">
+            <a:extLst>
+              <a:ext uri="{FF2B5EF4-FFF2-40B4-BE49-F238E27FC236}">
+                <a16:creationId xmlns:a16="http://schemas.microsoft.com/office/drawing/2014/main" id="{6A10B003-850B-4A2C-BF24-1CD1E2AAAC79}"/>
+              </a:ext>
+            </a:extLst>
+          </p:cNvPr>
+          <p:cNvSpPr/>
+          <p:nvPr/>
+        </p:nvSpPr>
+        <p:spPr>
+          <a:xfrm flipH="1" flipV="1">
+            <a:off x="9177251" y="3566159"/>
+            <a:ext cx="2607426" cy="1649767"/>
+          </a:xfrm>
+          <a:prstGeom prst="rect">
+            <a:avLst/>
+          </a:prstGeom>
+          <a:solidFill>
+            <a:srgbClr val="7030A0">
+              <a:alpha val="30196"/>
+            </a:srgbClr>
+          </a:solidFill>
+          <a:ln>
+            <a:solidFill>
+              <a:schemeClr val="accent6">
+                <a:lumMod val="50000"/>
+              </a:schemeClr>
+            </a:solidFill>
+          </a:ln>
+        </p:spPr>
+        <p:style>
+          <a:lnRef idx="2">
+            <a:schemeClr val="accent1">
+              <a:shade val="50000"/>
+            </a:schemeClr>
+          </a:lnRef>
+          <a:fillRef idx="1">
+            <a:schemeClr val="accent1"/>
+          </a:fillRef>
+          <a:effectRef idx="0">
+            <a:schemeClr val="accent1"/>
+          </a:effectRef>
+          <a:fontRef idx="minor">
+            <a:schemeClr val="lt1"/>
+          </a:fontRef>
+        </p:style>
+        <p:txBody>
+          <a:bodyPr rtlCol="0" anchor="ctr"/>
+          <a:lstStyle/>
+          <a:p>
+            <a:pPr algn="ctr"/>
+            <a:endParaRPr lang="de-CH"/>
+          </a:p>
+        </p:txBody>
+      </p:sp>
+      <p:sp>
+        <p:nvSpPr>
+          <p:cNvPr id="14" name="Textfeld 13">
+            <a:extLst>
+              <a:ext uri="{FF2B5EF4-FFF2-40B4-BE49-F238E27FC236}">
+                <a16:creationId xmlns:a16="http://schemas.microsoft.com/office/drawing/2014/main" id="{0360A07C-04CE-4DD2-BC2D-9F4BAB7BB69D}"/>
+              </a:ext>
+            </a:extLst>
+          </p:cNvPr>
+          <p:cNvSpPr txBox="1"/>
+          <p:nvPr/>
+        </p:nvSpPr>
+        <p:spPr>
+          <a:xfrm>
+            <a:off x="1055716" y="2310938"/>
+            <a:ext cx="2726575" cy="369332"/>
+          </a:xfrm>
+          <a:prstGeom prst="rect">
+            <a:avLst/>
+          </a:prstGeom>
+          <a:noFill/>
+        </p:spPr>
+        <p:txBody>
+          <a:bodyPr wrap="square" rtlCol="0">
+            <a:spAutoFit/>
+          </a:bodyPr>
+          <a:lstStyle/>
+          <a:p>
+            <a:r>
+              <a:rPr lang="de-CH" dirty="0">
+                <a:solidFill>
+                  <a:srgbClr val="00B0F0"/>
+                </a:solidFill>
+              </a:rPr>
+              <a:t>Permutation</a:t>
+            </a:r>
+          </a:p>
+        </p:txBody>
+      </p:sp>
+      <p:sp>
+        <p:nvSpPr>
+          <p:cNvPr id="15" name="Textfeld 14">
+            <a:extLst>
+              <a:ext uri="{FF2B5EF4-FFF2-40B4-BE49-F238E27FC236}">
+                <a16:creationId xmlns:a16="http://schemas.microsoft.com/office/drawing/2014/main" id="{3BD50728-F6AB-4A34-9EC8-4AF772E6CDBB}"/>
+              </a:ext>
+            </a:extLst>
+          </p:cNvPr>
+          <p:cNvSpPr txBox="1"/>
+          <p:nvPr/>
+        </p:nvSpPr>
+        <p:spPr>
+          <a:xfrm>
+            <a:off x="4574770" y="2278672"/>
+            <a:ext cx="2726575" cy="369332"/>
+          </a:xfrm>
+          <a:prstGeom prst="rect">
+            <a:avLst/>
+          </a:prstGeom>
+          <a:noFill/>
+        </p:spPr>
+        <p:txBody>
+          <a:bodyPr wrap="square" rtlCol="0">
+            <a:spAutoFit/>
+          </a:bodyPr>
+          <a:lstStyle/>
+          <a:p>
+            <a:r>
+              <a:rPr lang="de-CH" dirty="0" err="1">
+                <a:solidFill>
+                  <a:srgbClr val="00B050"/>
+                </a:solidFill>
+              </a:rPr>
+              <a:t>Combination</a:t>
+            </a:r>
+            <a:endParaRPr lang="de-CH" dirty="0">
+              <a:solidFill>
+                <a:srgbClr val="00B050"/>
+              </a:solidFill>
+            </a:endParaRPr>
+          </a:p>
+        </p:txBody>
+      </p:sp>
+      <p:sp>
+        <p:nvSpPr>
+          <p:cNvPr id="16" name="Textfeld 15">
+            <a:extLst>
+              <a:ext uri="{FF2B5EF4-FFF2-40B4-BE49-F238E27FC236}">
+                <a16:creationId xmlns:a16="http://schemas.microsoft.com/office/drawing/2014/main" id="{75918806-1D84-4FBD-93CA-88147C36CEBB}"/>
+              </a:ext>
+            </a:extLst>
+          </p:cNvPr>
+          <p:cNvSpPr txBox="1"/>
+          <p:nvPr/>
+        </p:nvSpPr>
+        <p:spPr>
+          <a:xfrm>
+            <a:off x="8321965" y="2278672"/>
+            <a:ext cx="2726575" cy="369332"/>
+          </a:xfrm>
+          <a:prstGeom prst="rect">
+            <a:avLst/>
+          </a:prstGeom>
+          <a:noFill/>
+        </p:spPr>
+        <p:txBody>
+          <a:bodyPr wrap="square" rtlCol="0">
+            <a:spAutoFit/>
+          </a:bodyPr>
+          <a:lstStyle/>
+          <a:p>
+            <a:r>
+              <a:rPr lang="de-CH" dirty="0" err="1">
+                <a:solidFill>
+                  <a:srgbClr val="7030A0"/>
+                </a:solidFill>
+              </a:rPr>
+              <a:t>Cartesian</a:t>
+            </a:r>
+            <a:r>
+              <a:rPr lang="de-CH" dirty="0">
+                <a:solidFill>
+                  <a:srgbClr val="7030A0"/>
+                </a:solidFill>
+              </a:rPr>
+              <a:t> </a:t>
+            </a:r>
+            <a:r>
+              <a:rPr lang="de-CH" dirty="0" err="1">
+                <a:solidFill>
+                  <a:srgbClr val="7030A0"/>
+                </a:solidFill>
+              </a:rPr>
+              <a:t>Product</a:t>
+            </a:r>
+            <a:endParaRPr lang="de-CH" dirty="0">
+              <a:solidFill>
+                <a:srgbClr val="7030A0"/>
+              </a:solidFill>
+            </a:endParaRPr>
+          </a:p>
+        </p:txBody>
+      </p:sp>
+      <p:sp>
+        <p:nvSpPr>
+          <p:cNvPr id="17" name="Rectangle 2">
+            <a:extLst>
+              <a:ext uri="{FF2B5EF4-FFF2-40B4-BE49-F238E27FC236}">
+                <a16:creationId xmlns:a16="http://schemas.microsoft.com/office/drawing/2014/main" id="{7E26223A-5B8E-43CF-B664-D4C8440216CE}"/>
+              </a:ext>
+            </a:extLst>
+          </p:cNvPr>
+          <p:cNvSpPr>
+            <a:spLocks noChangeArrowheads="1"/>
+          </p:cNvSpPr>
+          <p:nvPr/>
+        </p:nvSpPr>
+        <p:spPr bwMode="auto">
+          <a:xfrm>
+            <a:off x="8386387" y="5344603"/>
+            <a:ext cx="3085177" cy="830997"/>
+          </a:xfrm>
+          <a:prstGeom prst="rect">
+            <a:avLst/>
+          </a:prstGeom>
+          <a:noFill/>
+          <a:ln>
+            <a:noFill/>
+          </a:ln>
+          <a:effectLst/>
+          <a:extLst>
+            <a:ext uri="{909E8E84-426E-40DD-AFC4-6F175D3DCCD1}">
+              <a14:hiddenFill xmlns:a14="http://schemas.microsoft.com/office/drawing/2010/main">
+                <a:solidFill>
+                  <a:schemeClr val="accent1"/>
+                </a:solidFill>
+              </a14:hiddenFill>
+            </a:ext>
+            <a:ext uri="{91240B29-F687-4F45-9708-019B960494DF}">
+              <a14:hiddenLine xmlns:a14="http://schemas.microsoft.com/office/drawing/2010/main" w="9525">
+                <a:solidFill>
+                  <a:schemeClr val="tx1"/>
+                </a:solidFill>
+                <a:miter lim="800000"/>
+                <a:headEnd/>
+                <a:tailEnd/>
+              </a14:hiddenLine>
+            </a:ext>
+            <a:ext uri="{AF507438-7753-43E0-B8FC-AC1667EBCBE1}">
+              <a14:hiddenEffects xmlns:a14="http://schemas.microsoft.com/office/drawing/2010/main">
+                <a:effectLst>
+                  <a:outerShdw dist="35921" dir="2700000" algn="ctr" rotWithShape="0">
+                    <a:schemeClr val="bg2"/>
+                  </a:outerShdw>
+                </a:effectLst>
+              </a14:hiddenEffects>
+            </a:ext>
+          </a:extLst>
+        </p:spPr>
+        <p:txBody>
+          <a:bodyPr vert="horz" wrap="square" lIns="0" tIns="0" rIns="0" bIns="0" numCol="1" anchor="ctr" anchorCtr="0" compatLnSpc="1">
+            <a:prstTxWarp prst="textNoShape">
+              <a:avLst/>
+            </a:prstTxWarp>
+            <a:spAutoFit/>
+          </a:bodyPr>
+          <a:lstStyle/>
+          <a:p>
+            <a:pPr marL="0" marR="0" lvl="0" indent="0" algn="l" defTabSz="914400" rtl="0" eaLnBrk="0" fontAlgn="base" latinLnBrk="0" hangingPunct="0">
+              <a:lnSpc>
+                <a:spcPct val="100000"/>
+              </a:lnSpc>
+              <a:spcBef>
+                <a:spcPct val="0"/>
+              </a:spcBef>
+              <a:spcAft>
+                <a:spcPct val="0"/>
+              </a:spcAft>
+              <a:buClrTx/>
+              <a:buSzTx/>
+              <a:buFontTx/>
+              <a:buNone/>
+              <a:tabLst/>
+            </a:pPr>
+            <a:r>
+              <a:rPr kumimoji="0" lang="de-DE" altLang="de-DE" sz="900" b="0" i="0" u="none" strike="noStrike" cap="none" normalizeH="0" baseline="0" dirty="0" err="1">
+                <a:ln>
+                  <a:noFill/>
+                </a:ln>
+                <a:solidFill>
+                  <a:srgbClr val="242729"/>
+                </a:solidFill>
+                <a:effectLst/>
+                <a:latin typeface="Consolas" panose="020B0609020204030204" pitchFamily="49" charset="0"/>
+                <a:ea typeface="inherit"/>
+              </a:rPr>
+              <a:t>import</a:t>
+            </a:r>
+            <a:r>
+              <a:rPr kumimoji="0" lang="de-DE" altLang="de-DE" sz="900" b="0" i="0" u="none" strike="noStrike" cap="none" normalizeH="0" baseline="0" dirty="0">
+                <a:ln>
+                  <a:noFill/>
+                </a:ln>
+                <a:solidFill>
+                  <a:srgbClr val="242729"/>
+                </a:solidFill>
+                <a:effectLst/>
+                <a:latin typeface="Consolas" panose="020B0609020204030204" pitchFamily="49" charset="0"/>
+                <a:ea typeface="inherit"/>
+              </a:rPr>
+              <a:t> </a:t>
+            </a:r>
+            <a:r>
+              <a:rPr kumimoji="0" lang="de-DE" altLang="de-DE" sz="900" b="0" i="0" u="none" strike="noStrike" cap="none" normalizeH="0" baseline="0" dirty="0" err="1">
+                <a:ln>
+                  <a:noFill/>
+                </a:ln>
+                <a:solidFill>
+                  <a:srgbClr val="242729"/>
+                </a:solidFill>
+                <a:effectLst/>
+                <a:latin typeface="Consolas" panose="020B0609020204030204" pitchFamily="49" charset="0"/>
+                <a:ea typeface="inherit"/>
+              </a:rPr>
+              <a:t>itertools</a:t>
+            </a:r>
+            <a:r>
+              <a:rPr kumimoji="0" lang="de-DE" altLang="de-DE" sz="900" b="0" i="0" u="none" strike="noStrike" cap="none" normalizeH="0" baseline="0" dirty="0">
+                <a:ln>
+                  <a:noFill/>
+                </a:ln>
+                <a:solidFill>
+                  <a:srgbClr val="242729"/>
+                </a:solidFill>
+                <a:effectLst/>
+                <a:latin typeface="Consolas" panose="020B0609020204030204" pitchFamily="49" charset="0"/>
+                <a:ea typeface="inherit"/>
+              </a:rPr>
+              <a:t> </a:t>
+            </a:r>
+          </a:p>
+          <a:p>
+            <a:pPr marL="0" marR="0" lvl="0" indent="0" algn="l" defTabSz="914400" rtl="0" eaLnBrk="0" fontAlgn="base" latinLnBrk="0" hangingPunct="0">
+              <a:lnSpc>
+                <a:spcPct val="100000"/>
+              </a:lnSpc>
+              <a:spcBef>
+                <a:spcPct val="0"/>
+              </a:spcBef>
+              <a:spcAft>
+                <a:spcPct val="0"/>
+              </a:spcAft>
+              <a:buClrTx/>
+              <a:buSzTx/>
+              <a:buFontTx/>
+              <a:buNone/>
+              <a:tabLst/>
+            </a:pPr>
+            <a:r>
+              <a:rPr kumimoji="0" lang="de-DE" altLang="de-DE" sz="900" b="0" i="0" u="none" strike="noStrike" cap="none" normalizeH="0" baseline="0" dirty="0">
+                <a:ln>
+                  <a:noFill/>
+                </a:ln>
+                <a:solidFill>
+                  <a:srgbClr val="242729"/>
+                </a:solidFill>
+                <a:effectLst/>
+                <a:latin typeface="Consolas" panose="020B0609020204030204" pitchFamily="49" charset="0"/>
+                <a:ea typeface="inherit"/>
+              </a:rPr>
+              <a:t>x = [1, 2, 3] </a:t>
+            </a:r>
+          </a:p>
+          <a:p>
+            <a:pPr eaLnBrk="0" fontAlgn="base" hangingPunct="0">
+              <a:spcBef>
+                <a:spcPct val="0"/>
+              </a:spcBef>
+              <a:spcAft>
+                <a:spcPct val="0"/>
+              </a:spcAft>
+            </a:pPr>
+            <a:r>
+              <a:rPr kumimoji="0" lang="de-DE" altLang="de-DE" sz="900" b="0" i="0" u="none" strike="noStrike" cap="none" normalizeH="0" baseline="0" dirty="0">
+                <a:ln>
+                  <a:noFill/>
+                </a:ln>
+                <a:solidFill>
+                  <a:srgbClr val="242729"/>
+                </a:solidFill>
+                <a:effectLst/>
+                <a:latin typeface="Consolas" panose="020B0609020204030204" pitchFamily="49" charset="0"/>
+                <a:ea typeface="inherit"/>
+              </a:rPr>
+              <a:t>[p </a:t>
+            </a:r>
+            <a:r>
+              <a:rPr kumimoji="0" lang="de-DE" altLang="de-DE" sz="900" b="0" i="0" u="none" strike="noStrike" cap="none" normalizeH="0" baseline="0" dirty="0" err="1">
+                <a:ln>
+                  <a:noFill/>
+                </a:ln>
+                <a:solidFill>
+                  <a:srgbClr val="242729"/>
+                </a:solidFill>
+                <a:effectLst/>
+                <a:latin typeface="Consolas" panose="020B0609020204030204" pitchFamily="49" charset="0"/>
+                <a:ea typeface="inherit"/>
+              </a:rPr>
+              <a:t>for</a:t>
+            </a:r>
+            <a:r>
+              <a:rPr kumimoji="0" lang="de-DE" altLang="de-DE" sz="900" b="0" i="0" u="none" strike="noStrike" cap="none" normalizeH="0" baseline="0" dirty="0">
+                <a:ln>
+                  <a:noFill/>
+                </a:ln>
+                <a:solidFill>
+                  <a:srgbClr val="242729"/>
+                </a:solidFill>
+                <a:effectLst/>
+                <a:latin typeface="Consolas" panose="020B0609020204030204" pitchFamily="49" charset="0"/>
+                <a:ea typeface="inherit"/>
+              </a:rPr>
+              <a:t> p in </a:t>
+            </a:r>
+            <a:r>
+              <a:rPr kumimoji="0" lang="de-DE" altLang="de-DE" sz="900" b="0" i="0" u="none" strike="noStrike" cap="none" normalizeH="0" baseline="0" dirty="0" err="1">
+                <a:ln>
+                  <a:noFill/>
+                </a:ln>
+                <a:solidFill>
+                  <a:srgbClr val="242729"/>
+                </a:solidFill>
+                <a:effectLst/>
+                <a:latin typeface="Consolas" panose="020B0609020204030204" pitchFamily="49" charset="0"/>
+                <a:ea typeface="inherit"/>
+              </a:rPr>
+              <a:t>itertools.</a:t>
+            </a:r>
+            <a:r>
+              <a:rPr lang="de-DE" altLang="de-DE" sz="900" dirty="0" err="1">
+                <a:solidFill>
+                  <a:srgbClr val="242729"/>
+                </a:solidFill>
+                <a:latin typeface="Consolas" panose="020B0609020204030204" pitchFamily="49" charset="0"/>
+              </a:rPr>
+              <a:t>product</a:t>
+            </a:r>
+            <a:r>
+              <a:rPr lang="de-DE" altLang="de-DE" sz="900" dirty="0">
+                <a:solidFill>
+                  <a:srgbClr val="242729"/>
+                </a:solidFill>
+                <a:latin typeface="Consolas" panose="020B0609020204030204" pitchFamily="49" charset="0"/>
+              </a:rPr>
+              <a:t>(x, </a:t>
+            </a:r>
+            <a:r>
+              <a:rPr lang="de-DE" altLang="de-DE" sz="900" dirty="0" err="1">
+                <a:solidFill>
+                  <a:srgbClr val="242729"/>
+                </a:solidFill>
+                <a:latin typeface="Consolas" panose="020B0609020204030204" pitchFamily="49" charset="0"/>
+              </a:rPr>
+              <a:t>repeat</a:t>
+            </a:r>
+            <a:r>
+              <a:rPr lang="de-DE" altLang="de-DE" sz="900" dirty="0">
+                <a:solidFill>
+                  <a:srgbClr val="242729"/>
+                </a:solidFill>
+                <a:latin typeface="Consolas" panose="020B0609020204030204" pitchFamily="49" charset="0"/>
+              </a:rPr>
+              <a:t>=2)] </a:t>
+            </a:r>
+          </a:p>
+          <a:p>
+            <a:pPr eaLnBrk="0" fontAlgn="base" hangingPunct="0">
+              <a:spcBef>
+                <a:spcPct val="0"/>
+              </a:spcBef>
+              <a:spcAft>
+                <a:spcPct val="0"/>
+              </a:spcAft>
+            </a:pPr>
+            <a:r>
+              <a:rPr lang="de-DE" altLang="de-DE" sz="900" dirty="0">
+                <a:solidFill>
+                  <a:srgbClr val="242729"/>
+                </a:solidFill>
+                <a:latin typeface="Consolas" panose="020B0609020204030204" pitchFamily="49" charset="0"/>
+              </a:rPr>
+              <a:t>[(1, 1), (1, 2), (1, 3), </a:t>
+            </a:r>
+          </a:p>
+          <a:p>
+            <a:pPr eaLnBrk="0" fontAlgn="base" hangingPunct="0">
+              <a:spcBef>
+                <a:spcPct val="0"/>
+              </a:spcBef>
+              <a:spcAft>
+                <a:spcPct val="0"/>
+              </a:spcAft>
+            </a:pPr>
+            <a:r>
+              <a:rPr lang="de-DE" altLang="de-DE" sz="900" dirty="0">
+                <a:solidFill>
+                  <a:srgbClr val="242729"/>
+                </a:solidFill>
+                <a:latin typeface="Consolas" panose="020B0609020204030204" pitchFamily="49" charset="0"/>
+              </a:rPr>
+              <a:t>(2, 1), (2, 2), (2, 3), </a:t>
+            </a:r>
+          </a:p>
+          <a:p>
+            <a:pPr eaLnBrk="0" fontAlgn="base" hangingPunct="0">
+              <a:spcBef>
+                <a:spcPct val="0"/>
+              </a:spcBef>
+              <a:spcAft>
+                <a:spcPct val="0"/>
+              </a:spcAft>
+            </a:pPr>
+            <a:r>
+              <a:rPr lang="de-DE" altLang="de-DE" sz="900" dirty="0">
+                <a:solidFill>
+                  <a:srgbClr val="242729"/>
+                </a:solidFill>
+                <a:latin typeface="Consolas" panose="020B0609020204030204" pitchFamily="49" charset="0"/>
+              </a:rPr>
+              <a:t>(3, 1), (3, 2), (3, 3)]</a:t>
+            </a:r>
+          </a:p>
+        </p:txBody>
+      </p:sp>
+      <p:sp>
+        <p:nvSpPr>
+          <p:cNvPr id="19" name="Rectangle 2">
+            <a:extLst>
+              <a:ext uri="{FF2B5EF4-FFF2-40B4-BE49-F238E27FC236}">
+                <a16:creationId xmlns:a16="http://schemas.microsoft.com/office/drawing/2014/main" id="{91DBA21C-9467-4BA0-96B0-1BF6A1FEC04E}"/>
+              </a:ext>
+            </a:extLst>
+          </p:cNvPr>
+          <p:cNvSpPr>
+            <a:spLocks noChangeArrowheads="1"/>
+          </p:cNvSpPr>
+          <p:nvPr/>
+        </p:nvSpPr>
+        <p:spPr bwMode="auto">
+          <a:xfrm>
+            <a:off x="1055716" y="5584934"/>
+            <a:ext cx="3085177" cy="692497"/>
+          </a:xfrm>
+          <a:prstGeom prst="rect">
+            <a:avLst/>
+          </a:prstGeom>
+          <a:noFill/>
+          <a:ln>
+            <a:noFill/>
+          </a:ln>
+          <a:effectLst/>
+          <a:extLst>
+            <a:ext uri="{909E8E84-426E-40DD-AFC4-6F175D3DCCD1}">
+              <a14:hiddenFill xmlns:a14="http://schemas.microsoft.com/office/drawing/2010/main">
+                <a:solidFill>
+                  <a:schemeClr val="accent1"/>
+                </a:solidFill>
+              </a14:hiddenFill>
+            </a:ext>
+            <a:ext uri="{91240B29-F687-4F45-9708-019B960494DF}">
+              <a14:hiddenLine xmlns:a14="http://schemas.microsoft.com/office/drawing/2010/main" w="9525">
+                <a:solidFill>
+                  <a:schemeClr val="tx1"/>
+                </a:solidFill>
+                <a:miter lim="800000"/>
+                <a:headEnd/>
+                <a:tailEnd/>
+              </a14:hiddenLine>
+            </a:ext>
+            <a:ext uri="{AF507438-7753-43E0-B8FC-AC1667EBCBE1}">
+              <a14:hiddenEffects xmlns:a14="http://schemas.microsoft.com/office/drawing/2010/main">
+                <a:effectLst>
+                  <a:outerShdw dist="35921" dir="2700000" algn="ctr" rotWithShape="0">
+                    <a:schemeClr val="bg2"/>
+                  </a:outerShdw>
+                </a:effectLst>
+              </a14:hiddenEffects>
+            </a:ext>
+          </a:extLst>
+        </p:spPr>
+        <p:txBody>
+          <a:bodyPr vert="horz" wrap="square" lIns="0" tIns="0" rIns="0" bIns="0" numCol="1" anchor="ctr" anchorCtr="0" compatLnSpc="1">
+            <a:prstTxWarp prst="textNoShape">
+              <a:avLst/>
+            </a:prstTxWarp>
+            <a:spAutoFit/>
+          </a:bodyPr>
+          <a:lstStyle/>
+          <a:p>
+            <a:pPr marL="0" marR="0" lvl="0" indent="0" algn="l" defTabSz="914400" rtl="0" eaLnBrk="0" fontAlgn="base" latinLnBrk="0" hangingPunct="0">
+              <a:lnSpc>
+                <a:spcPct val="100000"/>
+              </a:lnSpc>
+              <a:spcBef>
+                <a:spcPct val="0"/>
+              </a:spcBef>
+              <a:spcAft>
+                <a:spcPct val="0"/>
+              </a:spcAft>
+              <a:buClrTx/>
+              <a:buSzTx/>
+              <a:buFontTx/>
+              <a:buNone/>
+              <a:tabLst/>
+            </a:pPr>
+            <a:r>
+              <a:rPr kumimoji="0" lang="de-DE" altLang="de-DE" sz="900" b="0" i="0" u="none" strike="noStrike" cap="none" normalizeH="0" baseline="0" dirty="0" err="1">
+                <a:ln>
+                  <a:noFill/>
+                </a:ln>
+                <a:solidFill>
+                  <a:srgbClr val="242729"/>
+                </a:solidFill>
+                <a:effectLst/>
+                <a:highlight>
+                  <a:srgbClr val="FFFF00"/>
+                </a:highlight>
+                <a:latin typeface="Consolas" panose="020B0609020204030204" pitchFamily="49" charset="0"/>
+                <a:ea typeface="inherit"/>
+              </a:rPr>
+              <a:t>import</a:t>
+            </a:r>
+            <a:r>
+              <a:rPr kumimoji="0" lang="de-DE" altLang="de-DE" sz="900" b="0" i="0" u="none" strike="noStrike" cap="none" normalizeH="0" baseline="0" dirty="0">
+                <a:ln>
+                  <a:noFill/>
+                </a:ln>
+                <a:solidFill>
+                  <a:srgbClr val="242729"/>
+                </a:solidFill>
+                <a:effectLst/>
+                <a:highlight>
+                  <a:srgbClr val="FFFF00"/>
+                </a:highlight>
+                <a:latin typeface="Consolas" panose="020B0609020204030204" pitchFamily="49" charset="0"/>
+                <a:ea typeface="inherit"/>
+              </a:rPr>
+              <a:t> </a:t>
+            </a:r>
+            <a:r>
+              <a:rPr kumimoji="0" lang="de-DE" altLang="de-DE" sz="900" b="0" i="0" u="none" strike="noStrike" cap="none" normalizeH="0" baseline="0" dirty="0" err="1">
+                <a:ln>
+                  <a:noFill/>
+                </a:ln>
+                <a:solidFill>
+                  <a:srgbClr val="242729"/>
+                </a:solidFill>
+                <a:effectLst/>
+                <a:highlight>
+                  <a:srgbClr val="FFFF00"/>
+                </a:highlight>
+                <a:latin typeface="Consolas" panose="020B0609020204030204" pitchFamily="49" charset="0"/>
+                <a:ea typeface="inherit"/>
+              </a:rPr>
+              <a:t>itertools</a:t>
+            </a:r>
+            <a:r>
+              <a:rPr kumimoji="0" lang="de-DE" altLang="de-DE" sz="900" b="0" i="0" u="none" strike="noStrike" cap="none" normalizeH="0" baseline="0" dirty="0">
+                <a:ln>
+                  <a:noFill/>
+                </a:ln>
+                <a:solidFill>
+                  <a:srgbClr val="242729"/>
+                </a:solidFill>
+                <a:effectLst/>
+                <a:highlight>
+                  <a:srgbClr val="FFFF00"/>
+                </a:highlight>
+                <a:latin typeface="Consolas" panose="020B0609020204030204" pitchFamily="49" charset="0"/>
+                <a:ea typeface="inherit"/>
+              </a:rPr>
+              <a:t> </a:t>
+            </a:r>
+          </a:p>
+          <a:p>
+            <a:pPr marL="0" marR="0" lvl="0" indent="0" algn="l" defTabSz="914400" rtl="0" eaLnBrk="0" fontAlgn="base" latinLnBrk="0" hangingPunct="0">
+              <a:lnSpc>
+                <a:spcPct val="100000"/>
+              </a:lnSpc>
+              <a:spcBef>
+                <a:spcPct val="0"/>
+              </a:spcBef>
+              <a:spcAft>
+                <a:spcPct val="0"/>
+              </a:spcAft>
+              <a:buClrTx/>
+              <a:buSzTx/>
+              <a:buFontTx/>
+              <a:buNone/>
+              <a:tabLst/>
+            </a:pPr>
+            <a:r>
+              <a:rPr kumimoji="0" lang="de-DE" altLang="de-DE" sz="900" b="0" i="0" u="none" strike="noStrike" cap="none" normalizeH="0" baseline="0" dirty="0">
+                <a:ln>
+                  <a:noFill/>
+                </a:ln>
+                <a:solidFill>
+                  <a:srgbClr val="242729"/>
+                </a:solidFill>
+                <a:effectLst/>
+                <a:highlight>
+                  <a:srgbClr val="FFFF00"/>
+                </a:highlight>
+                <a:latin typeface="Consolas" panose="020B0609020204030204" pitchFamily="49" charset="0"/>
+                <a:ea typeface="inherit"/>
+              </a:rPr>
+              <a:t>x = [1, 2, 3] </a:t>
+            </a:r>
+          </a:p>
+          <a:p>
+            <a:pPr eaLnBrk="0" fontAlgn="base" hangingPunct="0">
+              <a:spcBef>
+                <a:spcPct val="0"/>
+              </a:spcBef>
+              <a:spcAft>
+                <a:spcPct val="0"/>
+              </a:spcAft>
+            </a:pPr>
+            <a:r>
+              <a:rPr lang="en-US" altLang="de-DE" sz="900" dirty="0">
+                <a:solidFill>
+                  <a:srgbClr val="242729"/>
+                </a:solidFill>
+                <a:highlight>
+                  <a:srgbClr val="FFFF00"/>
+                </a:highlight>
+                <a:latin typeface="Consolas" panose="020B0609020204030204" pitchFamily="49" charset="0"/>
+                <a:ea typeface="inherit"/>
+              </a:rPr>
+              <a:t>list(</a:t>
+            </a:r>
+            <a:r>
+              <a:rPr lang="en-US" altLang="de-DE" sz="900" dirty="0" err="1">
+                <a:solidFill>
+                  <a:srgbClr val="242729"/>
+                </a:solidFill>
+                <a:highlight>
+                  <a:srgbClr val="FFFF00"/>
+                </a:highlight>
+                <a:latin typeface="Consolas" panose="020B0609020204030204" pitchFamily="49" charset="0"/>
+                <a:ea typeface="inherit"/>
+              </a:rPr>
+              <a:t>itertools.permutations</a:t>
+            </a:r>
+            <a:r>
+              <a:rPr lang="en-US" altLang="de-DE" sz="900" dirty="0">
+                <a:solidFill>
+                  <a:srgbClr val="242729"/>
+                </a:solidFill>
+                <a:highlight>
+                  <a:srgbClr val="FFFF00"/>
+                </a:highlight>
+                <a:latin typeface="Consolas" panose="020B0609020204030204" pitchFamily="49" charset="0"/>
+                <a:ea typeface="inherit"/>
+              </a:rPr>
+              <a:t>(x, 2))</a:t>
+            </a:r>
+          </a:p>
+          <a:p>
+            <a:pPr eaLnBrk="0" fontAlgn="base" hangingPunct="0">
+              <a:spcBef>
+                <a:spcPct val="0"/>
+              </a:spcBef>
+              <a:spcAft>
+                <a:spcPct val="0"/>
+              </a:spcAft>
+            </a:pPr>
+            <a:r>
+              <a:rPr lang="en-US" altLang="de-DE" sz="900" dirty="0">
+                <a:solidFill>
+                  <a:srgbClr val="242729"/>
+                </a:solidFill>
+                <a:highlight>
+                  <a:srgbClr val="FFFF00"/>
+                </a:highlight>
+                <a:latin typeface="Consolas" panose="020B0609020204030204" pitchFamily="49" charset="0"/>
+                <a:ea typeface="inherit"/>
+              </a:rPr>
+              <a:t>[(1, 2), (1, 3), (1, 4), (2, 1), (2, 3), (2, 4), (3, 1), (3, 2), (3, 4), (4, 1), (4, 2), (4, 3)]</a:t>
+            </a:r>
+          </a:p>
+        </p:txBody>
+      </p:sp>
+      <p:sp>
+        <p:nvSpPr>
+          <p:cNvPr id="22" name="Rectangle 2">
+            <a:extLst>
+              <a:ext uri="{FF2B5EF4-FFF2-40B4-BE49-F238E27FC236}">
+                <a16:creationId xmlns:a16="http://schemas.microsoft.com/office/drawing/2014/main" id="{5BC0ABE3-1786-438E-9BC5-F745F77A3FC8}"/>
+              </a:ext>
+            </a:extLst>
+          </p:cNvPr>
+          <p:cNvSpPr>
+            <a:spLocks noChangeArrowheads="1"/>
+          </p:cNvSpPr>
+          <p:nvPr/>
+        </p:nvSpPr>
+        <p:spPr bwMode="auto">
+          <a:xfrm>
+            <a:off x="4644968" y="5515684"/>
+            <a:ext cx="3085177" cy="692497"/>
+          </a:xfrm>
+          <a:prstGeom prst="rect">
+            <a:avLst/>
+          </a:prstGeom>
+          <a:noFill/>
+          <a:ln>
+            <a:noFill/>
+          </a:ln>
+          <a:effectLst/>
+          <a:extLst>
+            <a:ext uri="{909E8E84-426E-40DD-AFC4-6F175D3DCCD1}">
+              <a14:hiddenFill xmlns:a14="http://schemas.microsoft.com/office/drawing/2010/main">
+                <a:solidFill>
+                  <a:schemeClr val="accent1"/>
+                </a:solidFill>
+              </a14:hiddenFill>
+            </a:ext>
+            <a:ext uri="{91240B29-F687-4F45-9708-019B960494DF}">
+              <a14:hiddenLine xmlns:a14="http://schemas.microsoft.com/office/drawing/2010/main" w="9525">
+                <a:solidFill>
+                  <a:schemeClr val="tx1"/>
+                </a:solidFill>
+                <a:miter lim="800000"/>
+                <a:headEnd/>
+                <a:tailEnd/>
+              </a14:hiddenLine>
+            </a:ext>
+            <a:ext uri="{AF507438-7753-43E0-B8FC-AC1667EBCBE1}">
+              <a14:hiddenEffects xmlns:a14="http://schemas.microsoft.com/office/drawing/2010/main">
+                <a:effectLst>
+                  <a:outerShdw dist="35921" dir="2700000" algn="ctr" rotWithShape="0">
+                    <a:schemeClr val="bg2"/>
+                  </a:outerShdw>
+                </a:effectLst>
+              </a14:hiddenEffects>
+            </a:ext>
+          </a:extLst>
+        </p:spPr>
+        <p:txBody>
+          <a:bodyPr vert="horz" wrap="square" lIns="0" tIns="0" rIns="0" bIns="0" numCol="1" anchor="ctr" anchorCtr="0" compatLnSpc="1">
+            <a:prstTxWarp prst="textNoShape">
+              <a:avLst/>
+            </a:prstTxWarp>
+            <a:spAutoFit/>
+          </a:bodyPr>
+          <a:lstStyle/>
+          <a:p>
+            <a:pPr marL="0" marR="0" lvl="0" indent="0" algn="l" defTabSz="914400" rtl="0" eaLnBrk="0" fontAlgn="base" latinLnBrk="0" hangingPunct="0">
+              <a:lnSpc>
+                <a:spcPct val="100000"/>
+              </a:lnSpc>
+              <a:spcBef>
+                <a:spcPct val="0"/>
+              </a:spcBef>
+              <a:spcAft>
+                <a:spcPct val="0"/>
+              </a:spcAft>
+              <a:buClrTx/>
+              <a:buSzTx/>
+              <a:buFontTx/>
+              <a:buNone/>
+              <a:tabLst/>
+            </a:pPr>
+            <a:r>
+              <a:rPr kumimoji="0" lang="de-DE" altLang="de-DE" sz="900" b="0" i="0" u="none" strike="noStrike" cap="none" normalizeH="0" baseline="0" dirty="0" err="1">
+                <a:ln>
+                  <a:noFill/>
+                </a:ln>
+                <a:solidFill>
+                  <a:srgbClr val="242729"/>
+                </a:solidFill>
+                <a:effectLst/>
+                <a:latin typeface="Consolas" panose="020B0609020204030204" pitchFamily="49" charset="0"/>
+                <a:ea typeface="inherit"/>
+              </a:rPr>
+              <a:t>import</a:t>
+            </a:r>
+            <a:r>
+              <a:rPr kumimoji="0" lang="de-DE" altLang="de-DE" sz="900" b="0" i="0" u="none" strike="noStrike" cap="none" normalizeH="0" baseline="0" dirty="0">
+                <a:ln>
+                  <a:noFill/>
+                </a:ln>
+                <a:solidFill>
+                  <a:srgbClr val="242729"/>
+                </a:solidFill>
+                <a:effectLst/>
+                <a:latin typeface="Consolas" panose="020B0609020204030204" pitchFamily="49" charset="0"/>
+                <a:ea typeface="inherit"/>
+              </a:rPr>
+              <a:t> </a:t>
+            </a:r>
+            <a:r>
+              <a:rPr kumimoji="0" lang="de-DE" altLang="de-DE" sz="900" b="0" i="0" u="none" strike="noStrike" cap="none" normalizeH="0" baseline="0" dirty="0" err="1">
+                <a:ln>
+                  <a:noFill/>
+                </a:ln>
+                <a:solidFill>
+                  <a:srgbClr val="242729"/>
+                </a:solidFill>
+                <a:effectLst/>
+                <a:latin typeface="Consolas" panose="020B0609020204030204" pitchFamily="49" charset="0"/>
+                <a:ea typeface="inherit"/>
+              </a:rPr>
+              <a:t>itertools</a:t>
+            </a:r>
+            <a:r>
+              <a:rPr kumimoji="0" lang="de-DE" altLang="de-DE" sz="900" b="0" i="0" u="none" strike="noStrike" cap="none" normalizeH="0" baseline="0" dirty="0">
+                <a:ln>
+                  <a:noFill/>
+                </a:ln>
+                <a:solidFill>
+                  <a:srgbClr val="242729"/>
+                </a:solidFill>
+                <a:effectLst/>
+                <a:latin typeface="Consolas" panose="020B0609020204030204" pitchFamily="49" charset="0"/>
+                <a:ea typeface="inherit"/>
+              </a:rPr>
+              <a:t> </a:t>
+            </a:r>
+          </a:p>
+          <a:p>
+            <a:pPr marL="0" marR="0" lvl="0" indent="0" algn="l" defTabSz="914400" rtl="0" eaLnBrk="0" fontAlgn="base" latinLnBrk="0" hangingPunct="0">
+              <a:lnSpc>
+                <a:spcPct val="100000"/>
+              </a:lnSpc>
+              <a:spcBef>
+                <a:spcPct val="0"/>
+              </a:spcBef>
+              <a:spcAft>
+                <a:spcPct val="0"/>
+              </a:spcAft>
+              <a:buClrTx/>
+              <a:buSzTx/>
+              <a:buFontTx/>
+              <a:buNone/>
+              <a:tabLst/>
+            </a:pPr>
+            <a:r>
+              <a:rPr kumimoji="0" lang="de-DE" altLang="de-DE" sz="900" b="0" i="0" u="none" strike="noStrike" cap="none" normalizeH="0" baseline="0" dirty="0">
+                <a:ln>
+                  <a:noFill/>
+                </a:ln>
+                <a:solidFill>
+                  <a:srgbClr val="242729"/>
+                </a:solidFill>
+                <a:effectLst/>
+                <a:latin typeface="Consolas" panose="020B0609020204030204" pitchFamily="49" charset="0"/>
+                <a:ea typeface="inherit"/>
+              </a:rPr>
+              <a:t>x = [1, 2, 3] </a:t>
+            </a:r>
+          </a:p>
+          <a:p>
+            <a:r>
+              <a:rPr lang="en-US" sz="900" dirty="0"/>
+              <a:t>list(</a:t>
+            </a:r>
+            <a:r>
+              <a:rPr lang="en-US" sz="900" dirty="0" err="1"/>
+              <a:t>itertools.combinations</a:t>
+            </a:r>
+            <a:r>
+              <a:rPr lang="en-US" sz="900" dirty="0"/>
+              <a:t>(x, 2))</a:t>
+            </a:r>
+          </a:p>
+          <a:p>
+            <a:pPr eaLnBrk="0" fontAlgn="base" hangingPunct="0">
+              <a:spcBef>
+                <a:spcPct val="0"/>
+              </a:spcBef>
+              <a:spcAft>
+                <a:spcPct val="0"/>
+              </a:spcAft>
+            </a:pPr>
+            <a:r>
+              <a:rPr lang="en-US" sz="900" dirty="0"/>
+              <a:t>[(1, 2), (1, 3), </a:t>
+            </a:r>
+          </a:p>
+          <a:p>
+            <a:pPr eaLnBrk="0" fontAlgn="base" hangingPunct="0">
+              <a:spcBef>
+                <a:spcPct val="0"/>
+              </a:spcBef>
+              <a:spcAft>
+                <a:spcPct val="0"/>
+              </a:spcAft>
+            </a:pPr>
+            <a:r>
+              <a:rPr lang="en-US" sz="900" dirty="0"/>
+              <a:t>(2, 3)]</a:t>
+            </a:r>
+            <a:endParaRPr lang="de-CH" sz="900" dirty="0"/>
+          </a:p>
+        </p:txBody>
+      </p:sp>
+    </p:spTree>
+    <p:extLst>
+      <p:ext uri="{BB962C8B-B14F-4D97-AF65-F5344CB8AC3E}">
+        <p14:creationId xmlns:p14="http://schemas.microsoft.com/office/powerpoint/2010/main" val="1769732245"/>
+      </p:ext>
+    </p:extLst>
+  </p:cSld>
+  <p:clrMapOvr>
+    <a:masterClrMapping/>
+  </p:clrMapOvr>
+</p:sld>
+</file>
+
+<file path=ppt/slides/slide13.xml><?xml version="1.0" encoding="utf-8"?>
+<p:sld xmlns:a="http://schemas.openxmlformats.org/drawingml/2006/main" xmlns:r="http://schemas.openxmlformats.org/officeDocument/2006/relationships" xmlns:p="http://schemas.openxmlformats.org/presentationml/2006/main">
+  <p:cSld>
+    <p:spTree>
+      <p:nvGrpSpPr>
+        <p:cNvPr id="1" name=""/>
+        <p:cNvGrpSpPr/>
+        <p:nvPr/>
+      </p:nvGrpSpPr>
+      <p:grpSpPr>
+        <a:xfrm>
+          <a:off x="0" y="0"/>
+          <a:ext cx="0" cy="0"/>
+          <a:chOff x="0" y="0"/>
+          <a:chExt cx="0" cy="0"/>
+        </a:xfrm>
+      </p:grpSpPr>
+    </p:spTree>
+    <p:extLst>
+      <p:ext uri="{BB962C8B-B14F-4D97-AF65-F5344CB8AC3E}">
+        <p14:creationId xmlns:p14="http://schemas.microsoft.com/office/powerpoint/2010/main" val="3736473473"/>
+      </p:ext>
+    </p:extLst>
+  </p:cSld>
+  <p:clrMapOvr>
+    <a:masterClrMapping/>
+  </p:clrMapOvr>
+</p:sld>
+</file>
+
+<file path=ppt/slides/slide14.xml><?xml version="1.0" encoding="utf-8"?>
+<p:sld xmlns:a="http://schemas.openxmlformats.org/drawingml/2006/main" xmlns:r="http://schemas.openxmlformats.org/officeDocument/2006/relationships" xmlns:p="http://schemas.openxmlformats.org/presentationml/2006/main">
+  <p:cSld>
+    <p:spTree>
+      <p:nvGrpSpPr>
+        <p:cNvPr id="1" name=""/>
+        <p:cNvGrpSpPr/>
+        <p:nvPr/>
+      </p:nvGrpSpPr>
+      <p:grpSpPr>
+        <a:xfrm>
+          <a:off x="0" y="0"/>
+          <a:ext cx="0" cy="0"/>
+          <a:chOff x="0" y="0"/>
+          <a:chExt cx="0" cy="0"/>
+        </a:xfrm>
+      </p:grpSpPr>
+      <p:sp>
+        <p:nvSpPr>
           <p:cNvPr id="2" name="Titel 1"/>
           <p:cNvSpPr>
             <a:spLocks noGrp="1"/>

</xml_diff>